<commit_message>
Last push, after making typo and send to David
</commit_message>
<xml_diff>
--- a/doc/FinalPresentation.pptx
+++ b/doc/FinalPresentation.pptx
@@ -6,7 +6,7 @@
     <p:sldMasterId id="2147483741" r:id="rId2"/>
   </p:sldMasterIdLst>
   <p:notesMasterIdLst>
-    <p:notesMasterId r:id="rId26"/>
+    <p:notesMasterId r:id="rId27"/>
   </p:notesMasterIdLst>
   <p:sldIdLst>
     <p:sldId id="258" r:id="rId3"/>
@@ -27,11 +27,12 @@
     <p:sldId id="271" r:id="rId18"/>
     <p:sldId id="285" r:id="rId19"/>
     <p:sldId id="284" r:id="rId20"/>
-    <p:sldId id="288" r:id="rId21"/>
-    <p:sldId id="266" r:id="rId22"/>
-    <p:sldId id="272" r:id="rId23"/>
-    <p:sldId id="267" r:id="rId24"/>
-    <p:sldId id="287" r:id="rId25"/>
+    <p:sldId id="289" r:id="rId21"/>
+    <p:sldId id="288" r:id="rId22"/>
+    <p:sldId id="266" r:id="rId23"/>
+    <p:sldId id="272" r:id="rId24"/>
+    <p:sldId id="267" r:id="rId25"/>
+    <p:sldId id="287" r:id="rId26"/>
   </p:sldIdLst>
   <p:sldSz cx="12192000" cy="6858000"/>
   <p:notesSz cx="6858000" cy="9144000"/>
@@ -236,7 +237,7 @@
           <a:p>
             <a:fld id="{C95B8474-97D2-4EEA-8FB4-823BFCA28CD3}" type="datetimeFigureOut">
               <a:rPr lang="fr-FR" smtClean="0"/>
-              <a:t>24/01/2018</a:t>
+              <a:t>25/01/2018</a:t>
             </a:fld>
             <a:endParaRPr lang="fr-FR"/>
           </a:p>
@@ -552,10 +553,7 @@
           <a:bodyPr/>
           <a:lstStyle/>
           <a:p>
-            <a:r>
-              <a:rPr lang="en-US" dirty="0"/>
-              <a:t>Master student in CS</a:t>
-            </a:r>
+            <a:endParaRPr lang="en-US" dirty="0"/>
           </a:p>
         </p:txBody>
       </p:sp>
@@ -669,7 +667,7 @@
           <a:p>
             <a:fld id="{833D178B-5CCF-4246-B1CC-D230EF1E3CFE}" type="slidenum">
               <a:rPr lang="fr-FR" smtClean="0"/>
-              <a:t>21</a:t>
+              <a:t>22</a:t>
             </a:fld>
             <a:endParaRPr lang="fr-FR"/>
           </a:p>
@@ -1895,42 +1893,7 @@
           <a:bodyPr/>
           <a:lstStyle/>
           <a:p>
-            <a:r>
-              <a:rPr lang="fr-FR" dirty="0"/>
-              <a:t>Be more </a:t>
-            </a:r>
-            <a:r>
-              <a:rPr lang="fr-FR" dirty="0" err="1"/>
-              <a:t>synthetic</a:t>
-            </a:r>
-            <a:r>
-              <a:rPr lang="fr-FR" dirty="0"/>
-              <a:t>. </a:t>
-            </a:r>
-            <a:r>
-              <a:rPr lang="fr-FR" dirty="0" err="1"/>
-              <a:t>I’ll</a:t>
-            </a:r>
-            <a:r>
-              <a:rPr lang="fr-FR" dirty="0"/>
-              <a:t> </a:t>
-            </a:r>
-            <a:r>
-              <a:rPr lang="fr-FR" dirty="0" err="1"/>
-              <a:t>try</a:t>
-            </a:r>
-            <a:r>
-              <a:rPr lang="fr-FR" dirty="0"/>
-              <a:t> to </a:t>
-            </a:r>
-            <a:r>
-              <a:rPr lang="fr-FR" dirty="0" err="1"/>
-              <a:t>make</a:t>
-            </a:r>
-            <a:r>
-              <a:rPr lang="fr-FR" dirty="0"/>
-              <a:t> in the middle.</a:t>
-            </a:r>
+            <a:endParaRPr lang="fr-FR" dirty="0"/>
           </a:p>
         </p:txBody>
       </p:sp>
@@ -2249,7 +2212,7 @@
           <a:p>
             <a:fld id="{7497A43D-932B-4C35-8775-912B1E74D6B1}" type="datetimeFigureOut">
               <a:rPr lang="fr-FR" smtClean="0"/>
-              <a:t>24/01/2018</a:t>
+              <a:t>25/01/2018</a:t>
             </a:fld>
             <a:endParaRPr lang="fr-FR"/>
           </a:p>
@@ -2362,7 +2325,7 @@
           <a:p>
             <a:fld id="{7497A43D-932B-4C35-8775-912B1E74D6B1}" type="datetimeFigureOut">
               <a:rPr lang="fr-FR" smtClean="0"/>
-              <a:t>24/01/2018</a:t>
+              <a:t>25/01/2018</a:t>
             </a:fld>
             <a:endParaRPr lang="fr-FR"/>
           </a:p>
@@ -2673,7 +2636,7 @@
           <a:p>
             <a:fld id="{7497A43D-932B-4C35-8775-912B1E74D6B1}" type="datetimeFigureOut">
               <a:rPr lang="fr-FR" smtClean="0"/>
-              <a:t>24/01/2018</a:t>
+              <a:t>25/01/2018</a:t>
             </a:fld>
             <a:endParaRPr lang="fr-FR"/>
           </a:p>
@@ -2961,7 +2924,7 @@
           <a:p>
             <a:fld id="{7497A43D-932B-4C35-8775-912B1E74D6B1}" type="datetimeFigureOut">
               <a:rPr lang="fr-FR" smtClean="0"/>
-              <a:t>24/01/2018</a:t>
+              <a:t>25/01/2018</a:t>
             </a:fld>
             <a:endParaRPr lang="fr-FR"/>
           </a:p>
@@ -3159,7 +3122,7 @@
           <a:p>
             <a:fld id="{7497A43D-932B-4C35-8775-912B1E74D6B1}" type="datetimeFigureOut">
               <a:rPr lang="fr-FR" smtClean="0"/>
-              <a:t>24/01/2018</a:t>
+              <a:t>25/01/2018</a:t>
             </a:fld>
             <a:endParaRPr lang="fr-FR"/>
           </a:p>
@@ -3367,7 +3330,7 @@
           <a:p>
             <a:fld id="{7497A43D-932B-4C35-8775-912B1E74D6B1}" type="datetimeFigureOut">
               <a:rPr lang="fr-FR" smtClean="0"/>
-              <a:t>24/01/2018</a:t>
+              <a:t>25/01/2018</a:t>
             </a:fld>
             <a:endParaRPr lang="fr-FR"/>
           </a:p>
@@ -3802,7 +3765,7 @@
           <a:p>
             <a:fld id="{7497A43D-932B-4C35-8775-912B1E74D6B1}" type="datetimeFigureOut">
               <a:rPr lang="fr-FR" smtClean="0"/>
-              <a:t>24/01/2018</a:t>
+              <a:t>25/01/2018</a:t>
             </a:fld>
             <a:endParaRPr lang="fr-FR"/>
           </a:p>
@@ -4000,7 +3963,7 @@
           <a:p>
             <a:fld id="{7497A43D-932B-4C35-8775-912B1E74D6B1}" type="datetimeFigureOut">
               <a:rPr lang="fr-FR" smtClean="0"/>
-              <a:t>24/01/2018</a:t>
+              <a:t>25/01/2018</a:t>
             </a:fld>
             <a:endParaRPr lang="fr-FR"/>
           </a:p>
@@ -4275,7 +4238,7 @@
           <a:p>
             <a:fld id="{7497A43D-932B-4C35-8775-912B1E74D6B1}" type="datetimeFigureOut">
               <a:rPr lang="fr-FR" smtClean="0"/>
-              <a:t>24/01/2018</a:t>
+              <a:t>25/01/2018</a:t>
             </a:fld>
             <a:endParaRPr lang="fr-FR"/>
           </a:p>
@@ -4540,7 +4503,7 @@
           <a:p>
             <a:fld id="{7497A43D-932B-4C35-8775-912B1E74D6B1}" type="datetimeFigureOut">
               <a:rPr lang="fr-FR" smtClean="0"/>
-              <a:t>24/01/2018</a:t>
+              <a:t>25/01/2018</a:t>
             </a:fld>
             <a:endParaRPr lang="fr-FR"/>
           </a:p>
@@ -4952,7 +4915,7 @@
           <a:p>
             <a:fld id="{7497A43D-932B-4C35-8775-912B1E74D6B1}" type="datetimeFigureOut">
               <a:rPr lang="fr-FR" smtClean="0"/>
-              <a:t>24/01/2018</a:t>
+              <a:t>25/01/2018</a:t>
             </a:fld>
             <a:endParaRPr lang="fr-FR"/>
           </a:p>
@@ -6023,7 +5986,7 @@
           <a:p>
             <a:fld id="{7497A43D-932B-4C35-8775-912B1E74D6B1}" type="datetimeFigureOut">
               <a:rPr lang="fr-FR" smtClean="0"/>
-              <a:t>24/01/2018</a:t>
+              <a:t>25/01/2018</a:t>
             </a:fld>
             <a:endParaRPr lang="fr-FR"/>
           </a:p>
@@ -6510,7 +6473,7 @@
                 <a:latin typeface="Calibri" panose="020F0502020204030204" pitchFamily="34" charset="0"/>
                 <a:cs typeface="Calibri" panose="020F0502020204030204" pitchFamily="34" charset="0"/>
               </a:rPr>
-              <a:t>Supervised by :David </a:t>
+              <a:t>Supervised by: David </a:t>
             </a:r>
             <a:r>
               <a:rPr lang="en-US" sz="1700" dirty="0" err="1">
@@ -6539,6 +6502,27 @@
                 <a:cs typeface="Calibri" panose="020F0502020204030204" pitchFamily="34" charset="0"/>
               </a:rPr>
               <a:t>Troncoso-Pastoriza</a:t>
+            </a:r>
+            <a:endParaRPr lang="en-US" sz="1700" dirty="0">
+              <a:latin typeface="Calibri" panose="020F0502020204030204" pitchFamily="34" charset="0"/>
+              <a:cs typeface="Calibri" panose="020F0502020204030204" pitchFamily="34" charset="0"/>
+            </a:endParaRPr>
+          </a:p>
+          <a:p>
+            <a:pPr algn="r"/>
+            <a:r>
+              <a:rPr lang="en-US" sz="1700" dirty="0">
+                <a:latin typeface="Calibri" panose="020F0502020204030204" pitchFamily="34" charset="0"/>
+                <a:cs typeface="Calibri" panose="020F0502020204030204" pitchFamily="34" charset="0"/>
+              </a:rPr>
+              <a:t>Professor: Jean-Pierre </a:t>
+            </a:r>
+            <a:r>
+              <a:rPr lang="en-US" sz="1700" dirty="0" err="1">
+                <a:latin typeface="Calibri" panose="020F0502020204030204" pitchFamily="34" charset="0"/>
+                <a:cs typeface="Calibri" panose="020F0502020204030204" pitchFamily="34" charset="0"/>
+              </a:rPr>
+              <a:t>Hubaux</a:t>
             </a:r>
             <a:endParaRPr lang="en-US" sz="1700" dirty="0">
               <a:latin typeface="Calibri" panose="020F0502020204030204" pitchFamily="34" charset="0"/>
@@ -7867,8 +7851,8 @@
           </a:p>
         </p:txBody>
       </p:sp>
-      <mc:AlternateContent xmlns:mc="http://schemas.openxmlformats.org/markup-compatibility/2006" xmlns:a14="http://schemas.microsoft.com/office/drawing/2010/main">
-        <mc:Choice Requires="a14">
+      <mc:AlternateContent xmlns:mc="http://schemas.openxmlformats.org/markup-compatibility/2006">
+        <mc:Choice xmlns:a14="http://schemas.microsoft.com/office/drawing/2010/main" Requires="a14">
           <p:sp>
             <p:nvSpPr>
               <p:cNvPr id="15" name="ZoneTexte 14">
@@ -7883,8 +7867,8 @@
             </p:nvSpPr>
             <p:spPr>
               <a:xfrm>
-                <a:off x="5781822" y="1392701"/>
-                <a:ext cx="6410178" cy="3785652"/>
+                <a:off x="5781822" y="1253947"/>
+                <a:ext cx="6410178" cy="4093428"/>
               </a:xfrm>
               <a:prstGeom prst="rect">
                 <a:avLst/>
@@ -7972,8 +7956,37 @@
                 </a:r>
                 <a:r>
                   <a:rPr lang="fr-FR" sz="2000" dirty="0"/>
-                  <a:t> to 5</a:t>
-                </a:r>
+                  <a:t> to 5. Data are </a:t>
+                </a:r>
+                <a:r>
+                  <a:rPr lang="fr-FR" sz="2000" dirty="0" err="1"/>
+                  <a:t>assumed</a:t>
+                </a:r>
+                <a:r>
+                  <a:rPr lang="fr-FR" sz="2000" dirty="0"/>
+                  <a:t> to </a:t>
+                </a:r>
+                <a:r>
+                  <a:rPr lang="fr-FR" sz="2000" dirty="0" err="1"/>
+                  <a:t>be</a:t>
+                </a:r>
+                <a:r>
+                  <a:rPr lang="fr-FR" sz="2000" dirty="0"/>
+                  <a:t> </a:t>
+                </a:r>
+                <a:r>
+                  <a:rPr lang="fr-FR" sz="2000" dirty="0" err="1"/>
+                  <a:t>evenly</a:t>
+                </a:r>
+                <a:r>
+                  <a:rPr lang="fr-FR" sz="2000" dirty="0"/>
+                  <a:t> </a:t>
+                </a:r>
+                <a:r>
+                  <a:rPr lang="fr-FR" sz="2000" dirty="0" err="1"/>
+                  <a:t>distributed</a:t>
+                </a:r>
+                <a:endParaRPr lang="fr-FR" sz="2000" dirty="0"/>
               </a:p>
               <a:p>
                 <a:endParaRPr lang="fr-FR" sz="2000" dirty="0"/>
@@ -8180,7 +8193,7 @@
             </p:txBody>
           </p:sp>
         </mc:Choice>
-        <mc:Fallback xmlns="">
+        <mc:Fallback>
           <p:sp>
             <p:nvSpPr>
               <p:cNvPr id="15" name="ZoneTexte 14">
@@ -8197,8 +8210,8 @@
             </p:nvSpPr>
             <p:spPr>
               <a:xfrm>
-                <a:off x="5781822" y="1392701"/>
-                <a:ext cx="6410178" cy="3785652"/>
+                <a:off x="5781822" y="1253947"/>
+                <a:ext cx="6410178" cy="4093428"/>
               </a:xfrm>
               <a:prstGeom prst="rect">
                 <a:avLst/>
@@ -8206,7 +8219,7 @@
               <a:blipFill>
                 <a:blip r:embed="rId3"/>
                 <a:stretch>
-                  <a:fillRect l="-951" t="-644"/>
+                  <a:fillRect l="-951" t="-745"/>
                 </a:stretch>
               </a:blipFill>
             </p:spPr>
@@ -10890,6 +10903,336 @@
           <p:cNvPr id="2" name="Titre 1">
             <a:extLst>
               <a:ext uri="{FF2B5EF4-FFF2-40B4-BE49-F238E27FC236}">
+                <a16:creationId xmlns:a16="http://schemas.microsoft.com/office/drawing/2014/main" id="{EE926322-82A4-42D9-9483-D725FA0010CB}"/>
+              </a:ext>
+            </a:extLst>
+          </p:cNvPr>
+          <p:cNvSpPr>
+            <a:spLocks noGrp="1"/>
+          </p:cNvSpPr>
+          <p:nvPr>
+            <p:ph type="title"/>
+          </p:nvPr>
+        </p:nvSpPr>
+        <p:spPr/>
+        <p:txBody>
+          <a:bodyPr/>
+          <a:lstStyle/>
+          <a:p>
+            <a:r>
+              <a:rPr lang="fr-FR" sz="4500" b="0" dirty="0" err="1"/>
+              <a:t>Prio</a:t>
+            </a:r>
+            <a:r>
+              <a:rPr lang="fr-FR" sz="4500" b="0" dirty="0"/>
+              <a:t> </a:t>
+            </a:r>
+            <a:r>
+              <a:rPr lang="fr-FR" sz="4500" b="0" dirty="0" err="1"/>
+              <a:t>Measurements</a:t>
+            </a:r>
+            <a:endParaRPr lang="fr-FR" sz="4500" b="0" dirty="0"/>
+          </a:p>
+        </p:txBody>
+      </p:sp>
+      <p:sp>
+        <p:nvSpPr>
+          <p:cNvPr id="3" name="Espace réservé du contenu 2">
+            <a:extLst>
+              <a:ext uri="{FF2B5EF4-FFF2-40B4-BE49-F238E27FC236}">
+                <a16:creationId xmlns:a16="http://schemas.microsoft.com/office/drawing/2014/main" id="{8959C055-B04A-40CB-B052-AB17747BECDF}"/>
+              </a:ext>
+            </a:extLst>
+          </p:cNvPr>
+          <p:cNvSpPr>
+            <a:spLocks noGrp="1"/>
+          </p:cNvSpPr>
+          <p:nvPr>
+            <p:ph idx="1"/>
+          </p:nvPr>
+        </p:nvSpPr>
+        <p:spPr/>
+        <p:txBody>
+          <a:bodyPr/>
+          <a:lstStyle/>
+          <a:p>
+            <a:r>
+              <a:rPr lang="fr-FR" dirty="0" err="1"/>
+              <a:t>Prio</a:t>
+            </a:r>
+            <a:r>
+              <a:rPr lang="fr-FR" dirty="0"/>
+              <a:t> for 1 DP:</a:t>
+            </a:r>
+          </a:p>
+          <a:p>
+            <a:endParaRPr lang="fr-FR" dirty="0"/>
+          </a:p>
+        </p:txBody>
+      </p:sp>
+      <p:pic>
+        <p:nvPicPr>
+          <p:cNvPr id="5" name="Image 4">
+            <a:extLst>
+              <a:ext uri="{FF2B5EF4-FFF2-40B4-BE49-F238E27FC236}">
+                <a16:creationId xmlns:a16="http://schemas.microsoft.com/office/drawing/2014/main" id="{43C105AA-2DE9-4F45-9EE0-4B913772274C}"/>
+              </a:ext>
+            </a:extLst>
+          </p:cNvPr>
+          <p:cNvPicPr>
+            <a:picLocks noChangeAspect="1"/>
+          </p:cNvPicPr>
+          <p:nvPr/>
+        </p:nvPicPr>
+        <p:blipFill>
+          <a:blip r:embed="rId2">
+            <a:extLst>
+              <a:ext uri="{28A0092B-C50C-407E-A947-70E740481C1C}">
+                <a14:useLocalDpi xmlns:a14="http://schemas.microsoft.com/office/drawing/2010/main" val="0"/>
+              </a:ext>
+            </a:extLst>
+          </a:blip>
+          <a:stretch>
+            <a:fillRect/>
+          </a:stretch>
+        </p:blipFill>
+        <p:spPr>
+          <a:xfrm>
+            <a:off x="0" y="1744393"/>
+            <a:ext cx="12233329" cy="3404382"/>
+          </a:xfrm>
+          <a:prstGeom prst="rect">
+            <a:avLst/>
+          </a:prstGeom>
+        </p:spPr>
+      </p:pic>
+    </p:spTree>
+    <p:extLst>
+      <p:ext uri="{BB962C8B-B14F-4D97-AF65-F5344CB8AC3E}">
+        <p14:creationId xmlns:p14="http://schemas.microsoft.com/office/powerpoint/2010/main" val="3533869366"/>
+      </p:ext>
+    </p:extLst>
+  </p:cSld>
+  <p:clrMapOvr>
+    <a:masterClrMapping/>
+  </p:clrMapOvr>
+</p:sld>
+</file>
+
+<file path=ppt/slides/slide2.xml><?xml version="1.0" encoding="utf-8"?>
+<p:sld xmlns:a="http://schemas.openxmlformats.org/drawingml/2006/main" xmlns:r="http://schemas.openxmlformats.org/officeDocument/2006/relationships" xmlns:p="http://schemas.openxmlformats.org/presentationml/2006/main">
+  <p:cSld>
+    <p:spTree>
+      <p:nvGrpSpPr>
+        <p:cNvPr id="1" name=""/>
+        <p:cNvGrpSpPr/>
+        <p:nvPr/>
+      </p:nvGrpSpPr>
+      <p:grpSpPr>
+        <a:xfrm>
+          <a:off x="0" y="0"/>
+          <a:ext cx="0" cy="0"/>
+          <a:chOff x="0" y="0"/>
+          <a:chExt cx="0" cy="0"/>
+        </a:xfrm>
+      </p:grpSpPr>
+      <p:sp>
+        <p:nvSpPr>
+          <p:cNvPr id="2" name="Titre 1">
+            <a:extLst>
+              <a:ext uri="{FF2B5EF4-FFF2-40B4-BE49-F238E27FC236}">
+                <a16:creationId xmlns:a16="http://schemas.microsoft.com/office/drawing/2014/main" id="{4B14D577-ACE2-421C-A612-C4A2723C471F}"/>
+              </a:ext>
+            </a:extLst>
+          </p:cNvPr>
+          <p:cNvSpPr>
+            <a:spLocks noGrp="1"/>
+          </p:cNvSpPr>
+          <p:nvPr>
+            <p:ph type="title"/>
+          </p:nvPr>
+        </p:nvSpPr>
+        <p:spPr/>
+        <p:txBody>
+          <a:bodyPr/>
+          <a:lstStyle/>
+          <a:p>
+            <a:r>
+              <a:rPr lang="fr-FR" sz="4500" b="0" dirty="0" err="1"/>
+              <a:t>Outline</a:t>
+            </a:r>
+            <a:endParaRPr lang="fr-FR" sz="4500" b="0" dirty="0"/>
+          </a:p>
+        </p:txBody>
+      </p:sp>
+      <p:sp>
+        <p:nvSpPr>
+          <p:cNvPr id="3" name="Espace réservé du contenu 2">
+            <a:extLst>
+              <a:ext uri="{FF2B5EF4-FFF2-40B4-BE49-F238E27FC236}">
+                <a16:creationId xmlns:a16="http://schemas.microsoft.com/office/drawing/2014/main" id="{4DF1E4F0-9362-4906-921C-69CFECF3B182}"/>
+              </a:ext>
+            </a:extLst>
+          </p:cNvPr>
+          <p:cNvSpPr>
+            <a:spLocks noGrp="1"/>
+          </p:cNvSpPr>
+          <p:nvPr>
+            <p:ph idx="1"/>
+          </p:nvPr>
+        </p:nvSpPr>
+        <p:spPr/>
+        <p:txBody>
+          <a:bodyPr/>
+          <a:lstStyle/>
+          <a:p>
+            <a:r>
+              <a:rPr lang="fr-FR" sz="3000" dirty="0"/>
+              <a:t>Goals of the </a:t>
+            </a:r>
+            <a:r>
+              <a:rPr lang="fr-FR" sz="3000" dirty="0" err="1"/>
+              <a:t>project</a:t>
+            </a:r>
+            <a:endParaRPr lang="fr-FR" sz="3000" dirty="0"/>
+          </a:p>
+          <a:p>
+            <a:r>
+              <a:rPr lang="fr-FR" sz="3000" dirty="0" err="1"/>
+              <a:t>Systems</a:t>
+            </a:r>
+            <a:r>
+              <a:rPr lang="fr-FR" sz="3000" dirty="0"/>
+              <a:t> Design</a:t>
+            </a:r>
+          </a:p>
+          <a:p>
+            <a:r>
+              <a:rPr lang="fr-FR" sz="3000" dirty="0" err="1"/>
+              <a:t>Systems</a:t>
+            </a:r>
+            <a:r>
+              <a:rPr lang="fr-FR" sz="3000" dirty="0"/>
+              <a:t> </a:t>
+            </a:r>
+            <a:r>
+              <a:rPr lang="fr-FR" sz="3000" dirty="0" err="1"/>
+              <a:t>Comparison</a:t>
+            </a:r>
+            <a:endParaRPr lang="fr-FR" sz="3000" dirty="0"/>
+          </a:p>
+          <a:p>
+            <a:r>
+              <a:rPr lang="fr-FR" sz="3000" dirty="0" err="1"/>
+              <a:t>Prio’s</a:t>
+            </a:r>
+            <a:r>
+              <a:rPr lang="fr-FR" sz="3000" dirty="0"/>
+              <a:t> Input Range </a:t>
+            </a:r>
+            <a:r>
+              <a:rPr lang="fr-FR" sz="3000" dirty="0" err="1"/>
+              <a:t>explanation</a:t>
+            </a:r>
+            <a:endParaRPr lang="fr-FR" sz="3000" dirty="0"/>
+          </a:p>
+          <a:p>
+            <a:r>
+              <a:rPr lang="fr-FR" sz="3000" dirty="0"/>
+              <a:t>Novel </a:t>
+            </a:r>
+            <a:r>
+              <a:rPr lang="fr-FR" sz="3000" dirty="0" err="1"/>
+              <a:t>Unlynx</a:t>
+            </a:r>
+            <a:r>
+              <a:rPr lang="fr-FR" sz="3000" dirty="0"/>
+              <a:t> Input Range </a:t>
+            </a:r>
+            <a:r>
+              <a:rPr lang="fr-FR" sz="3000" dirty="0" err="1"/>
+              <a:t>Implementation</a:t>
+            </a:r>
+            <a:endParaRPr lang="fr-FR" sz="3000" dirty="0"/>
+          </a:p>
+          <a:p>
+            <a:r>
+              <a:rPr lang="fr-FR" sz="3000" dirty="0" err="1"/>
+              <a:t>Systems</a:t>
+            </a:r>
+            <a:r>
+              <a:rPr lang="fr-FR" sz="3000" dirty="0"/>
+              <a:t> </a:t>
+            </a:r>
+            <a:r>
+              <a:rPr lang="fr-FR" sz="3000" dirty="0" err="1"/>
+              <a:t>Comparison</a:t>
+            </a:r>
+            <a:r>
+              <a:rPr lang="fr-FR" sz="3000" dirty="0"/>
+              <a:t> </a:t>
+            </a:r>
+            <a:r>
+              <a:rPr lang="fr-FR" sz="3000" dirty="0" err="1"/>
+              <a:t>with</a:t>
+            </a:r>
+            <a:r>
+              <a:rPr lang="fr-FR" sz="3000" dirty="0"/>
+              <a:t> Input Range</a:t>
+            </a:r>
+          </a:p>
+          <a:p>
+            <a:r>
+              <a:rPr lang="fr-FR" sz="3000" dirty="0"/>
+              <a:t>Conclusion</a:t>
+            </a:r>
+          </a:p>
+          <a:p>
+            <a:r>
+              <a:rPr lang="fr-FR" sz="3000" dirty="0"/>
+              <a:t>Future Work</a:t>
+            </a:r>
+          </a:p>
+          <a:p>
+            <a:endParaRPr lang="fr-FR" sz="3000" dirty="0"/>
+          </a:p>
+        </p:txBody>
+      </p:sp>
+    </p:spTree>
+    <p:extLst>
+      <p:ext uri="{BB962C8B-B14F-4D97-AF65-F5344CB8AC3E}">
+        <p14:creationId xmlns:p14="http://schemas.microsoft.com/office/powerpoint/2010/main" val="2624252732"/>
+      </p:ext>
+    </p:extLst>
+  </p:cSld>
+  <p:clrMapOvr>
+    <a:masterClrMapping/>
+  </p:clrMapOvr>
+</p:sld>
+</file>
+
+<file path=ppt/slides/slide20.xml><?xml version="1.0" encoding="utf-8"?>
+<p:sld xmlns:a="http://schemas.openxmlformats.org/drawingml/2006/main" xmlns:r="http://schemas.openxmlformats.org/officeDocument/2006/relationships" xmlns:p="http://schemas.openxmlformats.org/presentationml/2006/main">
+  <p:cSld>
+    <p:spTree>
+      <p:nvGrpSpPr>
+        <p:cNvPr id="1" name=""/>
+        <p:cNvGrpSpPr/>
+        <p:nvPr/>
+      </p:nvGrpSpPr>
+      <p:grpSpPr>
+        <a:xfrm>
+          <a:off x="0" y="0"/>
+          <a:ext cx="0" cy="0"/>
+          <a:chOff x="0" y="0"/>
+          <a:chExt cx="0" cy="0"/>
+        </a:xfrm>
+      </p:grpSpPr>
+      <p:sp>
+        <p:nvSpPr>
+          <p:cNvPr id="2" name="Titre 1">
+            <a:extLst>
+              <a:ext uri="{FF2B5EF4-FFF2-40B4-BE49-F238E27FC236}">
                 <a16:creationId xmlns:a16="http://schemas.microsoft.com/office/drawing/2014/main" id="{B6F9CE71-80C1-4C4A-A1B8-664E503D0B4B}"/>
               </a:ext>
             </a:extLst>
@@ -10921,8 +11264,8 @@
           </a:p>
         </p:txBody>
       </p:sp>
-      <mc:AlternateContent xmlns:mc="http://schemas.openxmlformats.org/markup-compatibility/2006">
-        <mc:Choice xmlns:a14="http://schemas.microsoft.com/office/drawing/2010/main" Requires="a14">
+      <mc:AlternateContent xmlns:mc="http://schemas.openxmlformats.org/markup-compatibility/2006" xmlns:a14="http://schemas.microsoft.com/office/drawing/2010/main">
+        <mc:Choice Requires="a14">
           <p:sp>
             <p:nvSpPr>
               <p:cNvPr id="3" name="Espace réservé du contenu 2">
@@ -11175,25 +11518,7 @@
                       <a:rPr lang="fr-FR" i="1">
                         <a:latin typeface="Cambria Math" panose="02040503050406030204" pitchFamily="18" charset="0"/>
                       </a:rPr>
-                      <m:t> </m:t>
-                    </m:r>
-                    <m:r>
-                      <a:rPr lang="fr-FR" i="1">
-                        <a:latin typeface="Cambria Math" panose="02040503050406030204" pitchFamily="18" charset="0"/>
-                      </a:rPr>
-                      <m:t>∈[</m:t>
-                    </m:r>
-                    <m:r>
-                      <a:rPr lang="fr-FR" i="1">
-                        <a:latin typeface="Cambria Math" panose="02040503050406030204" pitchFamily="18" charset="0"/>
-                      </a:rPr>
-                      <m:t>0</m:t>
-                    </m:r>
-                    <m:r>
-                      <a:rPr lang="fr-FR" i="1">
-                        <a:latin typeface="Cambria Math" panose="02040503050406030204" pitchFamily="18" charset="0"/>
-                      </a:rPr>
-                      <m:t>,</m:t>
+                      <m:t> ∈[0,</m:t>
                     </m:r>
                     <m:sSup>
                       <m:sSupPr>
@@ -11272,13 +11597,7 @@
                           <a:rPr lang="fr-FR" i="1">
                             <a:latin typeface="Cambria Math" panose="02040503050406030204" pitchFamily="18" charset="0"/>
                           </a:rPr>
-                          <m:t>0</m:t>
-                        </m:r>
-                        <m:r>
-                          <a:rPr lang="fr-FR" i="1">
-                            <a:latin typeface="Cambria Math" panose="02040503050406030204" pitchFamily="18" charset="0"/>
-                          </a:rPr>
-                          <m:t>,</m:t>
+                          <m:t>0,</m:t>
                         </m:r>
                         <m:sSup>
                           <m:sSupPr>
@@ -11765,7 +12084,7 @@
             </p:txBody>
           </p:sp>
         </mc:Choice>
-        <mc:Fallback>
+        <mc:Fallback xmlns="">
           <p:sp>
             <p:nvSpPr>
               <p:cNvPr id="3" name="Espace réservé du contenu 2">
@@ -11818,199 +12137,7 @@
 </p:sld>
 </file>
 
-<file path=ppt/slides/slide2.xml><?xml version="1.0" encoding="utf-8"?>
-<p:sld xmlns:a="http://schemas.openxmlformats.org/drawingml/2006/main" xmlns:r="http://schemas.openxmlformats.org/officeDocument/2006/relationships" xmlns:p="http://schemas.openxmlformats.org/presentationml/2006/main">
-  <p:cSld>
-    <p:spTree>
-      <p:nvGrpSpPr>
-        <p:cNvPr id="1" name=""/>
-        <p:cNvGrpSpPr/>
-        <p:nvPr/>
-      </p:nvGrpSpPr>
-      <p:grpSpPr>
-        <a:xfrm>
-          <a:off x="0" y="0"/>
-          <a:ext cx="0" cy="0"/>
-          <a:chOff x="0" y="0"/>
-          <a:chExt cx="0" cy="0"/>
-        </a:xfrm>
-      </p:grpSpPr>
-      <p:sp>
-        <p:nvSpPr>
-          <p:cNvPr id="2" name="Titre 1">
-            <a:extLst>
-              <a:ext uri="{FF2B5EF4-FFF2-40B4-BE49-F238E27FC236}">
-                <a16:creationId xmlns:a16="http://schemas.microsoft.com/office/drawing/2014/main" id="{4B14D577-ACE2-421C-A612-C4A2723C471F}"/>
-              </a:ext>
-            </a:extLst>
-          </p:cNvPr>
-          <p:cNvSpPr>
-            <a:spLocks noGrp="1"/>
-          </p:cNvSpPr>
-          <p:nvPr>
-            <p:ph type="title"/>
-          </p:nvPr>
-        </p:nvSpPr>
-        <p:spPr/>
-        <p:txBody>
-          <a:bodyPr/>
-          <a:lstStyle/>
-          <a:p>
-            <a:r>
-              <a:rPr lang="fr-FR" sz="4500" b="0" dirty="0" err="1"/>
-              <a:t>Outline</a:t>
-            </a:r>
-            <a:endParaRPr lang="fr-FR" sz="4500" b="0" dirty="0"/>
-          </a:p>
-        </p:txBody>
-      </p:sp>
-      <p:sp>
-        <p:nvSpPr>
-          <p:cNvPr id="3" name="Espace réservé du contenu 2">
-            <a:extLst>
-              <a:ext uri="{FF2B5EF4-FFF2-40B4-BE49-F238E27FC236}">
-                <a16:creationId xmlns:a16="http://schemas.microsoft.com/office/drawing/2014/main" id="{4DF1E4F0-9362-4906-921C-69CFECF3B182}"/>
-              </a:ext>
-            </a:extLst>
-          </p:cNvPr>
-          <p:cNvSpPr>
-            <a:spLocks noGrp="1"/>
-          </p:cNvSpPr>
-          <p:nvPr>
-            <p:ph idx="1"/>
-          </p:nvPr>
-        </p:nvSpPr>
-        <p:spPr/>
-        <p:txBody>
-          <a:bodyPr/>
-          <a:lstStyle/>
-          <a:p>
-            <a:r>
-              <a:rPr lang="fr-FR" sz="3000" dirty="0"/>
-              <a:t>Goals of the </a:t>
-            </a:r>
-            <a:r>
-              <a:rPr lang="fr-FR" sz="3000" dirty="0" err="1"/>
-              <a:t>project</a:t>
-            </a:r>
-            <a:endParaRPr lang="fr-FR" sz="3000" dirty="0"/>
-          </a:p>
-          <a:p>
-            <a:r>
-              <a:rPr lang="fr-FR" sz="3000" dirty="0" err="1"/>
-              <a:t>Systems</a:t>
-            </a:r>
-            <a:r>
-              <a:rPr lang="fr-FR" sz="3000" dirty="0"/>
-              <a:t> Design</a:t>
-            </a:r>
-          </a:p>
-          <a:p>
-            <a:r>
-              <a:rPr lang="fr-FR" sz="3000" dirty="0" err="1"/>
-              <a:t>Systems</a:t>
-            </a:r>
-            <a:r>
-              <a:rPr lang="fr-FR" sz="3000" dirty="0"/>
-              <a:t> </a:t>
-            </a:r>
-            <a:r>
-              <a:rPr lang="fr-FR" sz="3000" dirty="0" err="1"/>
-              <a:t>Comparison</a:t>
-            </a:r>
-            <a:endParaRPr lang="fr-FR" sz="3000" dirty="0"/>
-          </a:p>
-          <a:p>
-            <a:r>
-              <a:rPr lang="fr-FR" sz="3000" dirty="0" err="1"/>
-              <a:t>Prio’s</a:t>
-            </a:r>
-            <a:r>
-              <a:rPr lang="fr-FR" sz="3000" dirty="0"/>
-              <a:t> Input Range </a:t>
-            </a:r>
-            <a:r>
-              <a:rPr lang="fr-FR" sz="3000" dirty="0" err="1"/>
-              <a:t>explanation</a:t>
-            </a:r>
-            <a:endParaRPr lang="fr-FR" sz="3000" dirty="0"/>
-          </a:p>
-          <a:p>
-            <a:r>
-              <a:rPr lang="fr-FR" sz="3000" dirty="0"/>
-              <a:t>Novel </a:t>
-            </a:r>
-            <a:r>
-              <a:rPr lang="fr-FR" sz="3000" dirty="0" err="1"/>
-              <a:t>Unlynx</a:t>
-            </a:r>
-            <a:r>
-              <a:rPr lang="fr-FR" sz="3000" dirty="0"/>
-              <a:t> Input Range </a:t>
-            </a:r>
-            <a:r>
-              <a:rPr lang="fr-FR" sz="3000" dirty="0" err="1"/>
-              <a:t>Implementation</a:t>
-            </a:r>
-            <a:endParaRPr lang="fr-FR" sz="3000" dirty="0"/>
-          </a:p>
-          <a:p>
-            <a:r>
-              <a:rPr lang="fr-FR" sz="3000" dirty="0" err="1"/>
-              <a:t>Systems</a:t>
-            </a:r>
-            <a:r>
-              <a:rPr lang="fr-FR" sz="3000" dirty="0"/>
-              <a:t> </a:t>
-            </a:r>
-            <a:r>
-              <a:rPr lang="fr-FR" sz="3000" dirty="0" err="1"/>
-              <a:t>Comparison</a:t>
-            </a:r>
-            <a:r>
-              <a:rPr lang="fr-FR" sz="3000" dirty="0"/>
-              <a:t> </a:t>
-            </a:r>
-            <a:r>
-              <a:rPr lang="fr-FR" sz="3000" dirty="0" err="1"/>
-              <a:t>with</a:t>
-            </a:r>
-            <a:r>
-              <a:rPr lang="fr-FR" sz="3000" dirty="0"/>
-              <a:t> Input Range</a:t>
-            </a:r>
-          </a:p>
-          <a:p>
-            <a:r>
-              <a:rPr lang="fr-FR" sz="3000" dirty="0"/>
-              <a:t>Conclusion</a:t>
-            </a:r>
-          </a:p>
-          <a:p>
-            <a:r>
-              <a:rPr lang="fr-FR" sz="3000" dirty="0"/>
-              <a:t>Future Work</a:t>
-            </a:r>
-          </a:p>
-          <a:p>
-            <a:endParaRPr lang="fr-FR" sz="3000" dirty="0"/>
-          </a:p>
-        </p:txBody>
-      </p:sp>
-    </p:spTree>
-    <p:extLst>
-      <p:ext uri="{BB962C8B-B14F-4D97-AF65-F5344CB8AC3E}">
-        <p14:creationId xmlns:p14="http://schemas.microsoft.com/office/powerpoint/2010/main" val="2624252732"/>
-      </p:ext>
-    </p:extLst>
-  </p:cSld>
-  <p:clrMapOvr>
-    <a:masterClrMapping/>
-  </p:clrMapOvr>
-</p:sld>
-</file>
-
-<file path=ppt/slides/slide20.xml><?xml version="1.0" encoding="utf-8"?>
+<file path=ppt/slides/slide21.xml><?xml version="1.0" encoding="utf-8"?>
 <p:sld xmlns:a="http://schemas.openxmlformats.org/drawingml/2006/main" xmlns:r="http://schemas.openxmlformats.org/officeDocument/2006/relationships" xmlns:p="http://schemas.openxmlformats.org/presentationml/2006/main">
   <p:cSld>
     <p:spTree>
@@ -13298,7 +13425,7 @@
 </p:sld>
 </file>
 
-<file path=ppt/slides/slide21.xml><?xml version="1.0" encoding="utf-8"?>
+<file path=ppt/slides/slide22.xml><?xml version="1.0" encoding="utf-8"?>
 <p:sld xmlns:a="http://schemas.openxmlformats.org/drawingml/2006/main" xmlns:r="http://schemas.openxmlformats.org/officeDocument/2006/relationships" xmlns:p="http://schemas.openxmlformats.org/presentationml/2006/main">
   <p:cSld>
     <p:spTree>
@@ -13352,8 +13479,8 @@
           </a:p>
         </p:txBody>
       </p:sp>
-      <mc:AlternateContent xmlns:mc="http://schemas.openxmlformats.org/markup-compatibility/2006" xmlns:a14="http://schemas.microsoft.com/office/drawing/2010/main">
-        <mc:Choice Requires="a14">
+      <mc:AlternateContent xmlns:mc="http://schemas.openxmlformats.org/markup-compatibility/2006">
+        <mc:Choice xmlns:a14="http://schemas.microsoft.com/office/drawing/2010/main" Requires="a14">
           <p:sp>
             <p:nvSpPr>
               <p:cNvPr id="3" name="Espace réservé du contenu 2">
@@ -14687,6 +14814,12 @@
                       <a:rPr lang="fr-FR" b="0" i="1" smtClean="0">
                         <a:latin typeface="Cambria Math" panose="02040503050406030204" pitchFamily="18" charset="0"/>
                       </a:rPr>
+                      <m:t>⋅</m:t>
+                    </m:r>
+                    <m:r>
+                      <a:rPr lang="fr-FR" b="0" i="1" smtClean="0">
+                        <a:latin typeface="Cambria Math" panose="02040503050406030204" pitchFamily="18" charset="0"/>
+                      </a:rPr>
                       <m:t>𝑐</m:t>
                     </m:r>
                   </m:oMath>
@@ -14763,7 +14896,19 @@
                       <a:rPr lang="fr-FR" b="0" i="1" smtClean="0">
                         <a:latin typeface="Cambria Math" panose="02040503050406030204" pitchFamily="18" charset="0"/>
                       </a:rPr>
-                      <m:t>𝑟𝑐</m:t>
+                      <m:t>𝑟</m:t>
+                    </m:r>
+                    <m:r>
+                      <a:rPr lang="fr-FR" b="0" i="1" smtClean="0">
+                        <a:latin typeface="Cambria Math" panose="02040503050406030204" pitchFamily="18" charset="0"/>
+                      </a:rPr>
+                      <m:t>⋅</m:t>
+                    </m:r>
+                    <m:r>
+                      <a:rPr lang="fr-FR" b="0" i="1" smtClean="0">
+                        <a:latin typeface="Cambria Math" panose="02040503050406030204" pitchFamily="18" charset="0"/>
+                      </a:rPr>
+                      <m:t>𝑐</m:t>
                     </m:r>
                     <m:r>
                       <a:rPr lang="fr-FR" b="0" i="1" smtClean="0">
@@ -14858,6 +15003,12 @@
                             </m:r>
                           </m:sup>
                         </m:sSup>
+                        <m:r>
+                          <a:rPr lang="fr-FR" b="0" i="1" smtClean="0">
+                            <a:latin typeface="Cambria Math" panose="02040503050406030204" pitchFamily="18" charset="0"/>
+                          </a:rPr>
+                          <m:t>⋅</m:t>
+                        </m:r>
                         <m:sSub>
                           <m:sSubPr>
                             <m:ctrlPr>
@@ -14986,7 +15137,19 @@
                       <a:rPr lang="fr-FR" b="0" i="1" smtClean="0">
                         <a:latin typeface="Cambria Math" panose="02040503050406030204" pitchFamily="18" charset="0"/>
                       </a:rPr>
-                      <m:t>𝐶𝑐</m:t>
+                      <m:t>𝐶</m:t>
+                    </m:r>
+                    <m:r>
+                      <a:rPr lang="fr-FR" b="0" i="1" smtClean="0">
+                        <a:latin typeface="Cambria Math" panose="02040503050406030204" pitchFamily="18" charset="0"/>
+                      </a:rPr>
+                      <m:t>⋅</m:t>
+                    </m:r>
+                    <m:r>
+                      <a:rPr lang="fr-FR" b="0" i="1" smtClean="0">
+                        <a:latin typeface="Cambria Math" panose="02040503050406030204" pitchFamily="18" charset="0"/>
+                      </a:rPr>
+                      <m:t>𝑐</m:t>
                     </m:r>
                     <m:r>
                       <a:rPr lang="fr-FR" b="0" i="1" smtClean="0">
@@ -14999,6 +15162,12 @@
                         <a:latin typeface="Cambria Math" panose="02040503050406030204" pitchFamily="18" charset="0"/>
                       </a:rPr>
                       <m:t>𝑃</m:t>
+                    </m:r>
+                    <m:r>
+                      <a:rPr lang="fr-FR" b="0" i="1" smtClean="0">
+                        <a:latin typeface="Cambria Math" panose="02040503050406030204" pitchFamily="18" charset="0"/>
+                      </a:rPr>
+                      <m:t>⋅</m:t>
                     </m:r>
                     <m:sSub>
                       <m:sSubPr>
@@ -15094,6 +15263,12 @@
                                 </m:ctrlPr>
                               </m:sSubPr>
                               <m:e>
+                                <m:r>
+                                  <a:rPr lang="fr-FR" b="0" i="1" smtClean="0">
+                                    <a:latin typeface="Cambria Math" panose="02040503050406030204" pitchFamily="18" charset="0"/>
+                                  </a:rPr>
+                                  <m:t>⋅</m:t>
+                                </m:r>
                                 <m:r>
                                   <a:rPr lang="fr-FR" b="0" i="1" smtClean="0">
                                     <a:latin typeface="Cambria Math" panose="02040503050406030204" pitchFamily="18" charset="0"/>
@@ -15458,7 +15633,7 @@
             </p:txBody>
           </p:sp>
         </mc:Choice>
-        <mc:Fallback xmlns="">
+        <mc:Fallback>
           <p:sp>
             <p:nvSpPr>
               <p:cNvPr id="3" name="Espace réservé du contenu 2">
@@ -15511,7 +15686,7 @@
 </p:sld>
 </file>
 
-<file path=ppt/slides/slide22.xml><?xml version="1.0" encoding="utf-8"?>
+<file path=ppt/slides/slide23.xml><?xml version="1.0" encoding="utf-8"?>
 <p:sld xmlns:a="http://schemas.openxmlformats.org/drawingml/2006/main" xmlns:r="http://schemas.openxmlformats.org/officeDocument/2006/relationships" xmlns:p="http://schemas.openxmlformats.org/presentationml/2006/main">
   <p:cSld>
     <p:spTree>
@@ -15855,7 +16030,7 @@
 </p:sld>
 </file>
 
-<file path=ppt/slides/slide23.xml><?xml version="1.0" encoding="utf-8"?>
+<file path=ppt/slides/slide24.xml><?xml version="1.0" encoding="utf-8"?>
 <p:sld xmlns:a="http://schemas.openxmlformats.org/drawingml/2006/main" xmlns:r="http://schemas.openxmlformats.org/officeDocument/2006/relationships" xmlns:p="http://schemas.openxmlformats.org/presentationml/2006/main">
   <p:cSld>
     <p:spTree>
@@ -15904,8 +16079,8 @@
           </a:p>
         </p:txBody>
       </p:sp>
-      <mc:AlternateContent xmlns:mc="http://schemas.openxmlformats.org/markup-compatibility/2006" xmlns:a14="http://schemas.microsoft.com/office/drawing/2010/main">
-        <mc:Choice Requires="a14">
+      <mc:AlternateContent xmlns:mc="http://schemas.openxmlformats.org/markup-compatibility/2006">
+        <mc:Choice xmlns:a14="http://schemas.microsoft.com/office/drawing/2010/main" Requires="a14">
           <p:sp>
             <p:nvSpPr>
               <p:cNvPr id="3" name="Espace réservé du contenu 2">
@@ -16154,6 +16329,21 @@
                 <a:endParaRPr lang="fr-FR" dirty="0"/>
               </a:p>
               <a:p>
+                <a:r>
+                  <a:rPr lang="fr-FR" dirty="0" err="1"/>
+                  <a:t>Unsure</a:t>
+                </a:r>
+                <a:r>
+                  <a:rPr lang="fr-FR" dirty="0"/>
+                  <a:t> for </a:t>
+                </a:r>
+                <a:r>
+                  <a:rPr lang="fr-FR" dirty="0" err="1"/>
+                  <a:t>ciphertexts</a:t>
+                </a:r>
+                <a:endParaRPr lang="fr-FR" dirty="0"/>
+              </a:p>
+              <a:p>
                 <a:endParaRPr lang="fr-FR" dirty="0"/>
               </a:p>
               <a:p>
@@ -16185,7 +16375,7 @@
             </p:txBody>
           </p:sp>
         </mc:Choice>
-        <mc:Fallback xmlns="">
+        <mc:Fallback>
           <p:sp>
             <p:nvSpPr>
               <p:cNvPr id="3" name="Espace réservé du contenu 2">
@@ -21541,7 +21731,7 @@
                 <a:pPr lvl="2"/>
                 <a:r>
                   <a:rPr lang="fr-FR" dirty="0" err="1"/>
-                  <a:t>Construct</a:t>
+                  <a:t>Constructs</a:t>
                 </a:r>
                 <a:r>
                   <a:rPr lang="fr-FR" dirty="0"/>
@@ -26510,8 +26700,8 @@
           </a:p>
         </p:txBody>
       </p:sp>
-      <mc:AlternateContent xmlns:mc="http://schemas.openxmlformats.org/markup-compatibility/2006">
-        <mc:Choice xmlns:a14="http://schemas.microsoft.com/office/drawing/2010/main" Requires="a14">
+      <mc:AlternateContent xmlns:mc="http://schemas.openxmlformats.org/markup-compatibility/2006" xmlns:a14="http://schemas.microsoft.com/office/drawing/2010/main">
+        <mc:Choice Requires="a14">
           <p:sp>
             <p:nvSpPr>
               <p:cNvPr id="3" name="Espace réservé du contenu 2">
@@ -27494,7 +27684,7 @@
             </p:txBody>
           </p:sp>
         </mc:Choice>
-        <mc:Fallback>
+        <mc:Fallback xmlns="">
           <p:sp>
             <p:nvSpPr>
               <p:cNvPr id="3" name="Espace réservé du contenu 2">
@@ -30182,8 +30372,8 @@
             </p:nvSpPr>
             <p:spPr>
               <a:xfrm rot="1281614">
-                <a:off x="2613880" y="3646002"/>
-                <a:ext cx="2409757" cy="394660"/>
+                <a:off x="2613880" y="3641226"/>
+                <a:ext cx="2409757" cy="404213"/>
               </a:xfrm>
               <a:prstGeom prst="rect">
                 <a:avLst/>
@@ -30363,13 +30553,7 @@
                         <a:rPr lang="fr-FR" b="0" i="1" smtClean="0">
                           <a:latin typeface="Cambria Math" panose="02040503050406030204" pitchFamily="18" charset="0"/>
                         </a:rPr>
-                        <m:t>,</m:t>
-                      </m:r>
-                      <m:r>
-                        <a:rPr lang="fr-FR" b="0" i="1" smtClean="0">
-                          <a:latin typeface="Cambria Math" panose="02040503050406030204" pitchFamily="18" charset="0"/>
-                        </a:rPr>
-                        <m:t> </m:t>
+                        <m:t>, </m:t>
                       </m:r>
                       <m:sSub>
                         <m:sSubPr>
@@ -30409,7 +30593,7 @@
                                 <a:rPr lang="fr-FR" b="0" i="1" smtClean="0">
                                   <a:latin typeface="Cambria Math" panose="02040503050406030204" pitchFamily="18" charset="0"/>
                                 </a:rPr>
-                                <m:t>1</m:t>
+                                <m:t>0</m:t>
                               </m:r>
                             </m:sub>
                           </m:sSub>
@@ -30459,7 +30643,7 @@
                                 <a:rPr lang="fr-FR" b="0" i="1" smtClean="0">
                                   <a:latin typeface="Cambria Math" panose="02040503050406030204" pitchFamily="18" charset="0"/>
                                 </a:rPr>
-                                <m:t>2</m:t>
+                                <m:t>1</m:t>
                               </m:r>
                             </m:sub>
                           </m:sSub>
@@ -30527,8 +30711,8 @@
             </p:nvSpPr>
             <p:spPr>
               <a:xfrm rot="1281614">
-                <a:off x="2613880" y="3646002"/>
-                <a:ext cx="2409757" cy="394660"/>
+                <a:off x="2613880" y="3641226"/>
+                <a:ext cx="2409757" cy="404213"/>
               </a:xfrm>
               <a:prstGeom prst="rect">
                 <a:avLst/>
@@ -30536,7 +30720,7 @@
               <a:blipFill>
                 <a:blip r:embed="rId13"/>
                 <a:stretch>
-                  <a:fillRect r="-16285" b="-9268"/>
+                  <a:fillRect r="-16539" b="-8696"/>
                 </a:stretch>
               </a:blipFill>
             </p:spPr>

</xml_diff>